<commit_message>
kaili changes + developer guide changes to UI
</commit_message>
<xml_diff>
--- a/docs/diagrams/UiComponentClassDiagram.pptx
+++ b/docs/diagrams/UiComponentClassDiagram.pptx
@@ -208,7 +208,7 @@
           <a:p>
             <a:fld id="{F5CC4B3F-88C1-4FFA-B1B6-F41C21DC6924}" type="datetimeFigureOut">
               <a:rPr lang="en-US" smtClean="0"/>
-              <a:t>1/7/2017</a:t>
+              <a:t>3/24/2017</a:t>
             </a:fld>
             <a:endParaRPr lang="en-US"/>
           </a:p>
@@ -654,7 +654,7 @@
           <a:p>
             <a:fld id="{78C97017-6FC3-485B-9764-EAC9E56C1D49}" type="datetimeFigureOut">
               <a:rPr lang="en-US" smtClean="0"/>
-              <a:t>1/7/2017</a:t>
+              <a:t>3/24/2017</a:t>
             </a:fld>
             <a:endParaRPr lang="en-US"/>
           </a:p>
@@ -822,7 +822,7 @@
           <a:p>
             <a:fld id="{78C97017-6FC3-485B-9764-EAC9E56C1D49}" type="datetimeFigureOut">
               <a:rPr lang="en-US" smtClean="0"/>
-              <a:t>1/7/2017</a:t>
+              <a:t>3/24/2017</a:t>
             </a:fld>
             <a:endParaRPr lang="en-US"/>
           </a:p>
@@ -1000,7 +1000,7 @@
           <a:p>
             <a:fld id="{78C97017-6FC3-485B-9764-EAC9E56C1D49}" type="datetimeFigureOut">
               <a:rPr lang="en-US" smtClean="0"/>
-              <a:t>1/7/2017</a:t>
+              <a:t>3/24/2017</a:t>
             </a:fld>
             <a:endParaRPr lang="en-US"/>
           </a:p>
@@ -1168,7 +1168,7 @@
           <a:p>
             <a:fld id="{78C97017-6FC3-485B-9764-EAC9E56C1D49}" type="datetimeFigureOut">
               <a:rPr lang="en-US" smtClean="0"/>
-              <a:t>1/7/2017</a:t>
+              <a:t>3/24/2017</a:t>
             </a:fld>
             <a:endParaRPr lang="en-US"/>
           </a:p>
@@ -1413,7 +1413,7 @@
           <a:p>
             <a:fld id="{78C97017-6FC3-485B-9764-EAC9E56C1D49}" type="datetimeFigureOut">
               <a:rPr lang="en-US" smtClean="0"/>
-              <a:t>1/7/2017</a:t>
+              <a:t>3/24/2017</a:t>
             </a:fld>
             <a:endParaRPr lang="en-US"/>
           </a:p>
@@ -1698,7 +1698,7 @@
           <a:p>
             <a:fld id="{78C97017-6FC3-485B-9764-EAC9E56C1D49}" type="datetimeFigureOut">
               <a:rPr lang="en-US" smtClean="0"/>
-              <a:t>1/7/2017</a:t>
+              <a:t>3/24/2017</a:t>
             </a:fld>
             <a:endParaRPr lang="en-US"/>
           </a:p>
@@ -2117,7 +2117,7 @@
           <a:p>
             <a:fld id="{78C97017-6FC3-485B-9764-EAC9E56C1D49}" type="datetimeFigureOut">
               <a:rPr lang="en-US" smtClean="0"/>
-              <a:t>1/7/2017</a:t>
+              <a:t>3/24/2017</a:t>
             </a:fld>
             <a:endParaRPr lang="en-US"/>
           </a:p>
@@ -2234,7 +2234,7 @@
           <a:p>
             <a:fld id="{78C97017-6FC3-485B-9764-EAC9E56C1D49}" type="datetimeFigureOut">
               <a:rPr lang="en-US" smtClean="0"/>
-              <a:t>1/7/2017</a:t>
+              <a:t>3/24/2017</a:t>
             </a:fld>
             <a:endParaRPr lang="en-US"/>
           </a:p>
@@ -2329,7 +2329,7 @@
           <a:p>
             <a:fld id="{78C97017-6FC3-485B-9764-EAC9E56C1D49}" type="datetimeFigureOut">
               <a:rPr lang="en-US" smtClean="0"/>
-              <a:t>1/7/2017</a:t>
+              <a:t>3/24/2017</a:t>
             </a:fld>
             <a:endParaRPr lang="en-US"/>
           </a:p>
@@ -2604,7 +2604,7 @@
           <a:p>
             <a:fld id="{78C97017-6FC3-485B-9764-EAC9E56C1D49}" type="datetimeFigureOut">
               <a:rPr lang="en-US" smtClean="0"/>
-              <a:t>1/7/2017</a:t>
+              <a:t>3/24/2017</a:t>
             </a:fld>
             <a:endParaRPr lang="en-US"/>
           </a:p>
@@ -2856,7 +2856,7 @@
           <a:p>
             <a:fld id="{78C97017-6FC3-485B-9764-EAC9E56C1D49}" type="datetimeFigureOut">
               <a:rPr lang="en-US" smtClean="0"/>
-              <a:t>1/7/2017</a:t>
+              <a:t>3/24/2017</a:t>
             </a:fld>
             <a:endParaRPr lang="en-US"/>
           </a:p>
@@ -3067,7 +3067,7 @@
           <a:p>
             <a:fld id="{78C97017-6FC3-485B-9764-EAC9E56C1D49}" type="datetimeFigureOut">
               <a:rPr lang="en-US" smtClean="0"/>
-              <a:t>1/7/2017</a:t>
+              <a:t>3/24/2017</a:t>
             </a:fld>
             <a:endParaRPr lang="en-US"/>
           </a:p>
@@ -3450,7 +3450,7 @@
         </p:nvSpPr>
         <p:spPr>
           <a:xfrm>
-            <a:off x="1217465" y="1447800"/>
+            <a:off x="1227618" y="1390114"/>
             <a:ext cx="4917083" cy="3962400"/>
           </a:xfrm>
           <a:prstGeom prst="roundRect">
@@ -3879,13 +3879,13 @@
       </p:sp>
       <p:sp>
         <p:nvSpPr>
-          <p:cNvPr id="34" name="Rectangle 11"/>
+          <p:cNvPr id="35" name="Rectangle 11"/>
           <p:cNvSpPr/>
           <p:nvPr/>
         </p:nvSpPr>
         <p:spPr>
           <a:xfrm>
-            <a:off x="2592528" y="3649359"/>
+            <a:off x="2581332" y="4411048"/>
             <a:ext cx="1093635" cy="236841"/>
           </a:xfrm>
           <a:prstGeom prst="rect">
@@ -3925,7 +3925,7 @@
                   </a:schemeClr>
                 </a:solidFill>
               </a:rPr>
-              <a:t>BrowserPanel</a:t>
+              <a:t>StatusBarFooter</a:t>
             </a:r>
             <a:endParaRPr lang="en-SG" sz="1050" b="1" dirty="0">
               <a:solidFill>
@@ -3939,13 +3939,13 @@
       </p:sp>
       <p:sp>
         <p:nvSpPr>
-          <p:cNvPr id="35" name="Rectangle 11"/>
+          <p:cNvPr id="36" name="Rectangle 11"/>
           <p:cNvSpPr/>
           <p:nvPr/>
         </p:nvSpPr>
         <p:spPr>
           <a:xfrm>
-            <a:off x="2592527" y="4563759"/>
+            <a:off x="2603723" y="3756184"/>
             <a:ext cx="1093635" cy="236841"/>
           </a:xfrm>
           <a:prstGeom prst="rect">
@@ -3985,7 +3985,7 @@
                   </a:schemeClr>
                 </a:solidFill>
               </a:rPr>
-              <a:t>StatusBarFooter</a:t>
+              <a:t>TaskListPanel</a:t>
             </a:r>
             <a:endParaRPr lang="en-SG" sz="1050" b="1" dirty="0">
               <a:solidFill>
@@ -3999,14 +3999,14 @@
       </p:sp>
       <p:sp>
         <p:nvSpPr>
-          <p:cNvPr id="36" name="Rectangle 11"/>
+          <p:cNvPr id="37" name="Rectangle 11"/>
           <p:cNvSpPr/>
           <p:nvPr/>
         </p:nvSpPr>
         <p:spPr>
           <a:xfrm>
-            <a:off x="2592526" y="3991960"/>
-            <a:ext cx="1093635" cy="236841"/>
+            <a:off x="3839323" y="4020832"/>
+            <a:ext cx="1040906" cy="236841"/>
           </a:xfrm>
           <a:prstGeom prst="rect">
             <a:avLst/>
@@ -4045,7 +4045,7 @@
                   </a:schemeClr>
                 </a:solidFill>
               </a:rPr>
-              <a:t>PersonListPanel</a:t>
+              <a:t>TaskCard</a:t>
             </a:r>
             <a:endParaRPr lang="en-SG" sz="1050" b="1" dirty="0">
               <a:solidFill>
@@ -4059,73 +4059,13 @@
       </p:sp>
       <p:sp>
         <p:nvSpPr>
-          <p:cNvPr id="37" name="Rectangle 11"/>
-          <p:cNvSpPr/>
-          <p:nvPr/>
-        </p:nvSpPr>
-        <p:spPr>
-          <a:xfrm>
-            <a:off x="3839323" y="4228801"/>
-            <a:ext cx="1040906" cy="236841"/>
-          </a:xfrm>
-          <a:prstGeom prst="rect">
-            <a:avLst/>
-          </a:prstGeom>
-          <a:ln w="19050">
-            <a:solidFill>
-              <a:schemeClr val="accent3"/>
-            </a:solidFill>
-          </a:ln>
-          <a:effectLst/>
-        </p:spPr>
-        <p:style>
-          <a:lnRef idx="1">
-            <a:schemeClr val="accent3"/>
-          </a:lnRef>
-          <a:fillRef idx="2">
-            <a:schemeClr val="accent3"/>
-          </a:fillRef>
-          <a:effectRef idx="1">
-            <a:schemeClr val="accent3"/>
-          </a:effectRef>
-          <a:fontRef idx="minor">
-            <a:schemeClr val="dk1"/>
-          </a:fontRef>
-        </p:style>
-        <p:txBody>
-          <a:bodyPr rtlCol="0" anchor="ctr"/>
-          <a:lstStyle/>
-          <a:p>
-            <a:pPr algn="ctr"/>
-            <a:r>
-              <a:rPr lang="en-US" sz="1050" b="1" dirty="0" err="1">
-                <a:solidFill>
-                  <a:schemeClr val="accent3">
-                    <a:lumMod val="75000"/>
-                  </a:schemeClr>
-                </a:solidFill>
-              </a:rPr>
-              <a:t>PersonCard</a:t>
-            </a:r>
-            <a:endParaRPr lang="en-SG" sz="1050" b="1" dirty="0">
-              <a:solidFill>
-                <a:schemeClr val="accent3">
-                  <a:lumMod val="75000"/>
-                </a:schemeClr>
-              </a:solidFill>
-            </a:endParaRPr>
-          </a:p>
-        </p:txBody>
-      </p:sp>
-      <p:sp>
-        <p:nvSpPr>
           <p:cNvPr id="38" name="Rectangle 11"/>
           <p:cNvSpPr/>
           <p:nvPr/>
         </p:nvSpPr>
         <p:spPr>
           <a:xfrm>
-            <a:off x="2592528" y="4966000"/>
+            <a:off x="2603723" y="4809971"/>
             <a:ext cx="1093635" cy="236841"/>
           </a:xfrm>
           <a:prstGeom prst="rect">
@@ -4328,47 +4268,6 @@
       </p:sp>
       <p:cxnSp>
         <p:nvCxnSpPr>
-          <p:cNvPr id="44" name="Elbow Connector 63"/>
-          <p:cNvCxnSpPr>
-            <a:stCxn id="39" idx="2"/>
-            <a:endCxn id="34" idx="1"/>
-          </p:cNvCxnSpPr>
-          <p:nvPr/>
-        </p:nvCxnSpPr>
-        <p:spPr>
-          <a:xfrm rot="16200000" flipH="1">
-            <a:off x="2054450" y="3229701"/>
-            <a:ext cx="899755" cy="176402"/>
-          </a:xfrm>
-          <a:prstGeom prst="bentConnector2">
-            <a:avLst/>
-          </a:prstGeom>
-          <a:ln w="19050">
-            <a:solidFill>
-              <a:schemeClr val="accent3"/>
-            </a:solidFill>
-            <a:headEnd type="none" w="med" len="med"/>
-            <a:tailEnd type="arrow" w="med" len="med"/>
-          </a:ln>
-          <a:effectLst/>
-        </p:spPr>
-        <p:style>
-          <a:lnRef idx="1">
-            <a:schemeClr val="accent2"/>
-          </a:lnRef>
-          <a:fillRef idx="2">
-            <a:schemeClr val="accent2"/>
-          </a:fillRef>
-          <a:effectRef idx="1">
-            <a:schemeClr val="accent2"/>
-          </a:effectRef>
-          <a:fontRef idx="minor">
-            <a:schemeClr val="dk1"/>
-          </a:fontRef>
-        </p:style>
-      </p:cxnSp>
-      <p:cxnSp>
-        <p:nvCxnSpPr>
           <p:cNvPr id="47" name="Elbow Connector 63"/>
           <p:cNvCxnSpPr>
             <a:stCxn id="39" idx="2"/>
@@ -4378,8 +4277,8 @@
         </p:nvCxnSpPr>
         <p:spPr>
           <a:xfrm rot="16200000" flipH="1">
-            <a:off x="1883148" y="3401003"/>
-            <a:ext cx="1242356" cy="176400"/>
+            <a:off x="2006634" y="3277516"/>
+            <a:ext cx="1006580" cy="187597"/>
           </a:xfrm>
           <a:prstGeom prst="bentConnector2">
             <a:avLst/>
@@ -4419,8 +4318,8 @@
         </p:nvCxnSpPr>
         <p:spPr>
           <a:xfrm rot="16200000" flipH="1">
-            <a:off x="1597249" y="3686901"/>
-            <a:ext cx="1814155" cy="176401"/>
+            <a:off x="1668007" y="3616144"/>
+            <a:ext cx="1661444" cy="165206"/>
           </a:xfrm>
           <a:prstGeom prst="bentConnector2">
             <a:avLst/>
@@ -4459,7 +4358,7 @@
         </p:nvCxnSpPr>
         <p:spPr>
           <a:xfrm rot="16200000" flipH="1">
-            <a:off x="1184119" y="3676012"/>
+            <a:off x="1195314" y="3519983"/>
             <a:ext cx="2396440" cy="420377"/>
           </a:xfrm>
           <a:prstGeom prst="bentConnector2">
@@ -4620,49 +4519,8 @@
         </p:nvCxnSpPr>
         <p:spPr>
           <a:xfrm rot="5400000">
-            <a:off x="4174488" y="2991741"/>
-            <a:ext cx="2061222" cy="649740"/>
-          </a:xfrm>
-          <a:prstGeom prst="bentConnector2">
-            <a:avLst/>
-          </a:prstGeom>
-          <a:ln w="6350">
-            <a:solidFill>
-              <a:schemeClr val="accent3"/>
-            </a:solidFill>
-            <a:headEnd type="none" w="med" len="med"/>
-            <a:tailEnd type="none" w="med" len="med"/>
-          </a:ln>
-          <a:effectLst/>
-        </p:spPr>
-        <p:style>
-          <a:lnRef idx="1">
-            <a:schemeClr val="accent2"/>
-          </a:lnRef>
-          <a:fillRef idx="2">
-            <a:schemeClr val="accent2"/>
-          </a:fillRef>
-          <a:effectRef idx="1">
-            <a:schemeClr val="accent2"/>
-          </a:effectRef>
-          <a:fontRef idx="minor">
-            <a:schemeClr val="dk1"/>
-          </a:fontRef>
-        </p:style>
-      </p:cxnSp>
-      <p:cxnSp>
-        <p:nvCxnSpPr>
-          <p:cNvPr id="82" name="Elbow Connector 63"/>
-          <p:cNvCxnSpPr>
-            <a:stCxn id="16" idx="3"/>
-            <a:endCxn id="34" idx="3"/>
-          </p:cNvCxnSpPr>
-          <p:nvPr/>
-        </p:nvCxnSpPr>
-        <p:spPr>
-          <a:xfrm rot="5400000">
-            <a:off x="3867176" y="2104987"/>
-            <a:ext cx="1481780" cy="1843806"/>
+            <a:off x="4278473" y="2887756"/>
+            <a:ext cx="1853253" cy="649740"/>
           </a:xfrm>
           <a:prstGeom prst="bentConnector2">
             <a:avLst/>
@@ -4743,8 +4601,8 @@
         </p:nvCxnSpPr>
         <p:spPr>
           <a:xfrm rot="5400000">
-            <a:off x="3409976" y="2562187"/>
-            <a:ext cx="2396180" cy="1843807"/>
+            <a:off x="3480734" y="2480233"/>
+            <a:ext cx="2243469" cy="1855002"/>
           </a:xfrm>
           <a:prstGeom prst="bentConnector2">
             <a:avLst/>
@@ -4784,8 +4642,8 @@
         </p:nvCxnSpPr>
         <p:spPr>
           <a:xfrm rot="5400000">
-            <a:off x="3208856" y="2763307"/>
-            <a:ext cx="2798421" cy="1843806"/>
+            <a:off x="3292468" y="2690891"/>
+            <a:ext cx="2642392" cy="1832611"/>
           </a:xfrm>
           <a:prstGeom prst="bentConnector2">
             <a:avLst/>
@@ -5161,6 +5019,7 @@
         <p:nvCxnSpPr>
           <p:cNvPr id="137" name="Elbow Connector 136"/>
           <p:cNvCxnSpPr>
+            <a:cxnSpLocks/>
             <a:stCxn id="36" idx="2"/>
             <a:endCxn id="37" idx="1"/>
           </p:cNvCxnSpPr>
@@ -5168,8 +5027,8 @@
         </p:nvCxnSpPr>
         <p:spPr>
           <a:xfrm rot="16200000" flipH="1">
-            <a:off x="3430123" y="3938021"/>
-            <a:ext cx="118421" cy="699979"/>
+            <a:off x="3421818" y="3721748"/>
+            <a:ext cx="146228" cy="688782"/>
           </a:xfrm>
           <a:prstGeom prst="bentConnector2">
             <a:avLst/>
@@ -5209,8 +5068,8 @@
         </p:nvCxnSpPr>
         <p:spPr>
           <a:xfrm rot="5400000">
-            <a:off x="3695875" y="2276286"/>
-            <a:ext cx="1824381" cy="1843808"/>
+            <a:off x="3819362" y="2163997"/>
+            <a:ext cx="1588605" cy="1832611"/>
           </a:xfrm>
           <a:prstGeom prst="bentConnector2">
             <a:avLst/>
@@ -5435,7 +5294,7 @@
         </p:nvSpPr>
         <p:spPr>
           <a:xfrm flipV="1">
-            <a:off x="4114799" y="4472708"/>
+            <a:off x="4110475" y="4274663"/>
             <a:ext cx="2642195" cy="101600"/>
           </a:xfrm>
           <a:custGeom>

</xml_diff>